<commit_message>
Volatility Index Completed - AM
</commit_message>
<xml_diff>
--- a/Code/Andres_Mejia/Visualizations_AM.pptx
+++ b/Code/Andres_Mejia/Visualizations_AM.pptx
@@ -12,6 +12,9 @@
     <p:sldId id="260" r:id="rId6"/>
     <p:sldId id="261" r:id="rId7"/>
     <p:sldId id="262" r:id="rId8"/>
+    <p:sldId id="263" r:id="rId9"/>
+    <p:sldId id="264" r:id="rId10"/>
+    <p:sldId id="265" r:id="rId11"/>
   </p:sldIdLst>
   <p:sldSz cx="12192000" cy="6858000"/>
   <p:notesSz cx="6858000" cy="9144000"/>
@@ -289,7 +292,7 @@
           <a:p>
             <a:fld id="{48A87A34-81AB-432B-8DAE-1953F412C126}" type="datetimeFigureOut">
               <a:rPr lang="en-US" dirty="0"/>
-              <a:t>2/8/20</a:t>
+              <a:t>2/9/20</a:t>
             </a:fld>
             <a:endParaRPr lang="en-US" dirty="0"/>
           </a:p>
@@ -596,7 +599,7 @@
           <a:p>
             <a:fld id="{48A87A34-81AB-432B-8DAE-1953F412C126}" type="datetimeFigureOut">
               <a:rPr lang="en-US" dirty="0"/>
-              <a:t>2/8/20</a:t>
+              <a:t>2/9/20</a:t>
             </a:fld>
             <a:endParaRPr lang="en-US" dirty="0"/>
           </a:p>
@@ -813,7 +816,7 @@
           <a:p>
             <a:fld id="{48A87A34-81AB-432B-8DAE-1953F412C126}" type="datetimeFigureOut">
               <a:rPr lang="en-US" dirty="0"/>
-              <a:t>2/8/20</a:t>
+              <a:t>2/9/20</a:t>
             </a:fld>
             <a:endParaRPr lang="en-US" dirty="0"/>
           </a:p>
@@ -1099,7 +1102,7 @@
           <a:p>
             <a:fld id="{48A87A34-81AB-432B-8DAE-1953F412C126}" type="datetimeFigureOut">
               <a:rPr lang="en-US" dirty="0"/>
-              <a:t>2/8/20</a:t>
+              <a:t>2/9/20</a:t>
             </a:fld>
             <a:endParaRPr lang="en-US" dirty="0"/>
           </a:p>
@@ -1548,7 +1551,7 @@
           <a:p>
             <a:fld id="{48A87A34-81AB-432B-8DAE-1953F412C126}" type="datetimeFigureOut">
               <a:rPr lang="en-US" dirty="0"/>
-              <a:t>2/8/20</a:t>
+              <a:t>2/9/20</a:t>
             </a:fld>
             <a:endParaRPr lang="en-US" dirty="0"/>
           </a:p>
@@ -2119,7 +2122,7 @@
           <a:p>
             <a:fld id="{48A87A34-81AB-432B-8DAE-1953F412C126}" type="datetimeFigureOut">
               <a:rPr lang="en-US" dirty="0"/>
-              <a:t>2/8/20</a:t>
+              <a:t>2/9/20</a:t>
             </a:fld>
             <a:endParaRPr lang="en-US" dirty="0"/>
           </a:p>
@@ -2966,7 +2969,7 @@
           <a:p>
             <a:fld id="{48A87A34-81AB-432B-8DAE-1953F412C126}" type="datetimeFigureOut">
               <a:rPr lang="en-US" dirty="0"/>
-              <a:t>2/8/20</a:t>
+              <a:t>2/9/20</a:t>
             </a:fld>
             <a:endParaRPr lang="en-US" dirty="0"/>
           </a:p>
@@ -3166,7 +3169,7 @@
           <a:p>
             <a:fld id="{48A87A34-81AB-432B-8DAE-1953F412C126}" type="datetimeFigureOut">
               <a:rPr lang="en-US" dirty="0"/>
-              <a:t>2/8/20</a:t>
+              <a:t>2/9/20</a:t>
             </a:fld>
             <a:endParaRPr lang="en-US" dirty="0"/>
           </a:p>
@@ -3375,7 +3378,7 @@
           <a:p>
             <a:fld id="{48A87A34-81AB-432B-8DAE-1953F412C126}" type="datetimeFigureOut">
               <a:rPr lang="en-US" dirty="0"/>
-              <a:t>2/8/20</a:t>
+              <a:t>2/9/20</a:t>
             </a:fld>
             <a:endParaRPr lang="en-US" dirty="0"/>
           </a:p>
@@ -3575,7 +3578,7 @@
           <a:p>
             <a:fld id="{48A87A34-81AB-432B-8DAE-1953F412C126}" type="datetimeFigureOut">
               <a:rPr lang="en-US" dirty="0"/>
-              <a:t>2/8/20</a:t>
+              <a:t>2/9/20</a:t>
             </a:fld>
             <a:endParaRPr lang="en-US" dirty="0"/>
           </a:p>
@@ -3850,7 +3853,7 @@
           <a:p>
             <a:fld id="{48A87A34-81AB-432B-8DAE-1953F412C126}" type="datetimeFigureOut">
               <a:rPr lang="en-US" dirty="0"/>
-              <a:t>2/8/20</a:t>
+              <a:t>2/9/20</a:t>
             </a:fld>
             <a:endParaRPr lang="en-US" dirty="0"/>
           </a:p>
@@ -4112,7 +4115,7 @@
           <a:p>
             <a:fld id="{48A87A34-81AB-432B-8DAE-1953F412C126}" type="datetimeFigureOut">
               <a:rPr lang="en-US" dirty="0"/>
-              <a:t>2/8/20</a:t>
+              <a:t>2/9/20</a:t>
             </a:fld>
             <a:endParaRPr lang="en-US" dirty="0"/>
           </a:p>
@@ -4522,7 +4525,7 @@
           <a:p>
             <a:fld id="{48A87A34-81AB-432B-8DAE-1953F412C126}" type="datetimeFigureOut">
               <a:rPr lang="en-US" dirty="0"/>
-              <a:t>2/8/20</a:t>
+              <a:t>2/9/20</a:t>
             </a:fld>
             <a:endParaRPr lang="en-US" dirty="0"/>
           </a:p>
@@ -4665,7 +4668,7 @@
           <a:p>
             <a:fld id="{48A87A34-81AB-432B-8DAE-1953F412C126}" type="datetimeFigureOut">
               <a:rPr lang="en-US" dirty="0"/>
-              <a:t>2/8/20</a:t>
+              <a:t>2/9/20</a:t>
             </a:fld>
             <a:endParaRPr lang="en-US" dirty="0"/>
           </a:p>
@@ -4785,7 +4788,7 @@
           <a:p>
             <a:fld id="{48A87A34-81AB-432B-8DAE-1953F412C126}" type="datetimeFigureOut">
               <a:rPr lang="en-US" dirty="0"/>
-              <a:t>2/8/20</a:t>
+              <a:t>2/9/20</a:t>
             </a:fld>
             <a:endParaRPr lang="en-US" dirty="0"/>
           </a:p>
@@ -5059,7 +5062,7 @@
           <a:p>
             <a:fld id="{48A87A34-81AB-432B-8DAE-1953F412C126}" type="datetimeFigureOut">
               <a:rPr lang="en-US" dirty="0"/>
-              <a:t>2/8/20</a:t>
+              <a:t>2/9/20</a:t>
             </a:fld>
             <a:endParaRPr lang="en-US" dirty="0"/>
           </a:p>
@@ -5366,7 +5369,7 @@
           <a:p>
             <a:fld id="{48A87A34-81AB-432B-8DAE-1953F412C126}" type="datetimeFigureOut">
               <a:rPr lang="en-US" dirty="0"/>
-              <a:t>2/8/20</a:t>
+              <a:t>2/9/20</a:t>
             </a:fld>
             <a:endParaRPr lang="en-US" dirty="0"/>
           </a:p>
@@ -5615,7 +5618,7 @@
             <a:fld id="{48A87A34-81AB-432B-8DAE-1953F412C126}" type="datetimeFigureOut">
               <a:rPr lang="en-US" dirty="0"/>
               <a:pPr/>
-              <a:t>2/8/20</a:t>
+              <a:t>2/9/20</a:t>
             </a:fld>
             <a:endParaRPr lang="en-US" dirty="0"/>
           </a:p>
@@ -6124,6 +6127,211 @@
 </p:sld>
 </file>
 
+<file path=ppt/slides/slide10.xml><?xml version="1.0" encoding="utf-8"?>
+<p:sld xmlns:a="http://schemas.openxmlformats.org/drawingml/2006/main" xmlns:r="http://schemas.openxmlformats.org/officeDocument/2006/relationships" xmlns:p="http://schemas.openxmlformats.org/presentationml/2006/main">
+  <p:cSld>
+    <p:spTree>
+      <p:nvGrpSpPr>
+        <p:cNvPr id="1" name=""/>
+        <p:cNvGrpSpPr/>
+        <p:nvPr/>
+      </p:nvGrpSpPr>
+      <p:grpSpPr>
+        <a:xfrm>
+          <a:off x="0" y="0"/>
+          <a:ext cx="0" cy="0"/>
+          <a:chOff x="0" y="0"/>
+          <a:chExt cx="0" cy="0"/>
+        </a:xfrm>
+      </p:grpSpPr>
+      <p:sp>
+        <p:nvSpPr>
+          <p:cNvPr id="2" name="Title 1">
+            <a:extLst>
+              <a:ext uri="{FF2B5EF4-FFF2-40B4-BE49-F238E27FC236}">
+                <a16:creationId xmlns:a16="http://schemas.microsoft.com/office/drawing/2014/main" id="{CB42E2D6-819E-C24C-B2F2-A46C55ACF6E4}"/>
+              </a:ext>
+            </a:extLst>
+          </p:cNvPr>
+          <p:cNvSpPr>
+            <a:spLocks noGrp="1"/>
+          </p:cNvSpPr>
+          <p:nvPr>
+            <p:ph type="title"/>
+          </p:nvPr>
+        </p:nvSpPr>
+        <p:spPr/>
+        <p:txBody>
+          <a:bodyPr/>
+          <a:lstStyle/>
+          <a:p>
+            <a:r>
+              <a:rPr lang="en-US" dirty="0"/>
+              <a:t>Volatility Index</a:t>
+            </a:r>
+            <a:br>
+              <a:rPr lang="en-US" dirty="0"/>
+            </a:br>
+            <a:r>
+              <a:rPr lang="en-US" dirty="0"/>
+              <a:t>(Tailor Made – S&amp;P500 Visualization)</a:t>
+            </a:r>
+          </a:p>
+        </p:txBody>
+      </p:sp>
+      <p:pic>
+        <p:nvPicPr>
+          <p:cNvPr id="7" name="Picture 6">
+            <a:extLst>
+              <a:ext uri="{FF2B5EF4-FFF2-40B4-BE49-F238E27FC236}">
+                <a16:creationId xmlns:a16="http://schemas.microsoft.com/office/drawing/2014/main" id="{22C88FBD-DC8B-7C4A-A80E-ED89FDF57CE2}"/>
+              </a:ext>
+            </a:extLst>
+          </p:cNvPr>
+          <p:cNvPicPr>
+            <a:picLocks noChangeAspect="1"/>
+          </p:cNvPicPr>
+          <p:nvPr/>
+        </p:nvPicPr>
+        <p:blipFill>
+          <a:blip r:embed="rId2"/>
+          <a:stretch>
+            <a:fillRect/>
+          </a:stretch>
+        </p:blipFill>
+        <p:spPr>
+          <a:xfrm>
+            <a:off x="913775" y="1919899"/>
+            <a:ext cx="4687338" cy="2077107"/>
+          </a:xfrm>
+          <a:prstGeom prst="rect">
+            <a:avLst/>
+          </a:prstGeom>
+          <a:ln>
+            <a:solidFill>
+              <a:srgbClr val="FF0000"/>
+            </a:solidFill>
+          </a:ln>
+        </p:spPr>
+      </p:pic>
+      <p:pic>
+        <p:nvPicPr>
+          <p:cNvPr id="8" name="Picture 7">
+            <a:extLst>
+              <a:ext uri="{FF2B5EF4-FFF2-40B4-BE49-F238E27FC236}">
+                <a16:creationId xmlns:a16="http://schemas.microsoft.com/office/drawing/2014/main" id="{BB6DECE4-FCCD-1343-B373-16318E81BC8A}"/>
+              </a:ext>
+            </a:extLst>
+          </p:cNvPr>
+          <p:cNvPicPr>
+            <a:picLocks noChangeAspect="1"/>
+          </p:cNvPicPr>
+          <p:nvPr/>
+        </p:nvPicPr>
+        <p:blipFill>
+          <a:blip r:embed="rId3"/>
+          <a:stretch>
+            <a:fillRect/>
+          </a:stretch>
+        </p:blipFill>
+        <p:spPr>
+          <a:xfrm>
+            <a:off x="6584044" y="1919899"/>
+            <a:ext cx="4701026" cy="2083173"/>
+          </a:xfrm>
+          <a:prstGeom prst="rect">
+            <a:avLst/>
+          </a:prstGeom>
+          <a:ln>
+            <a:solidFill>
+              <a:srgbClr val="FF0000"/>
+            </a:solidFill>
+          </a:ln>
+        </p:spPr>
+      </p:pic>
+      <p:pic>
+        <p:nvPicPr>
+          <p:cNvPr id="9" name="Picture 8">
+            <a:extLst>
+              <a:ext uri="{FF2B5EF4-FFF2-40B4-BE49-F238E27FC236}">
+                <a16:creationId xmlns:a16="http://schemas.microsoft.com/office/drawing/2014/main" id="{CB8B88FE-8DF0-8644-B8D3-AB9AF1902C97}"/>
+              </a:ext>
+            </a:extLst>
+          </p:cNvPr>
+          <p:cNvPicPr>
+            <a:picLocks noChangeAspect="1"/>
+          </p:cNvPicPr>
+          <p:nvPr/>
+        </p:nvPicPr>
+        <p:blipFill>
+          <a:blip r:embed="rId4"/>
+          <a:stretch>
+            <a:fillRect/>
+          </a:stretch>
+        </p:blipFill>
+        <p:spPr>
+          <a:xfrm>
+            <a:off x="918002" y="4333160"/>
+            <a:ext cx="4683111" cy="2075234"/>
+          </a:xfrm>
+          <a:prstGeom prst="rect">
+            <a:avLst/>
+          </a:prstGeom>
+          <a:ln>
+            <a:solidFill>
+              <a:srgbClr val="FF0000"/>
+            </a:solidFill>
+          </a:ln>
+        </p:spPr>
+      </p:pic>
+      <p:pic>
+        <p:nvPicPr>
+          <p:cNvPr id="10" name="Picture 9">
+            <a:extLst>
+              <a:ext uri="{FF2B5EF4-FFF2-40B4-BE49-F238E27FC236}">
+                <a16:creationId xmlns:a16="http://schemas.microsoft.com/office/drawing/2014/main" id="{0DA00CD9-6296-5942-8706-BDCBFA2AC19C}"/>
+              </a:ext>
+            </a:extLst>
+          </p:cNvPr>
+          <p:cNvPicPr>
+            <a:picLocks noChangeAspect="1"/>
+          </p:cNvPicPr>
+          <p:nvPr/>
+        </p:nvPicPr>
+        <p:blipFill>
+          <a:blip r:embed="rId5"/>
+          <a:stretch>
+            <a:fillRect/>
+          </a:stretch>
+        </p:blipFill>
+        <p:spPr>
+          <a:xfrm>
+            <a:off x="6584044" y="4333161"/>
+            <a:ext cx="4683111" cy="2075234"/>
+          </a:xfrm>
+          <a:prstGeom prst="rect">
+            <a:avLst/>
+          </a:prstGeom>
+          <a:ln>
+            <a:solidFill>
+              <a:srgbClr val="FF0000"/>
+            </a:solidFill>
+          </a:ln>
+        </p:spPr>
+      </p:pic>
+    </p:spTree>
+    <p:extLst>
+      <p:ext uri="{BB962C8B-B14F-4D97-AF65-F5344CB8AC3E}">
+        <p14:creationId xmlns:p14="http://schemas.microsoft.com/office/powerpoint/2010/main" val="3294145054"/>
+      </p:ext>
+    </p:extLst>
+  </p:cSld>
+  <p:clrMapOvr>
+    <a:masterClrMapping/>
+  </p:clrMapOvr>
+</p:sld>
+</file>
+
 <file path=ppt/slides/slide2.xml><?xml version="1.0" encoding="utf-8"?>
 <p:sld xmlns:a="http://schemas.openxmlformats.org/drawingml/2006/main" xmlns:r="http://schemas.openxmlformats.org/officeDocument/2006/relationships" xmlns:p="http://schemas.openxmlformats.org/presentationml/2006/main">
   <p:cSld>
@@ -7550,12 +7758,132 @@
           </a:p>
         </p:txBody>
       </p:sp>
+      <p:sp>
+        <p:nvSpPr>
+          <p:cNvPr id="6" name="TextBox 5">
+            <a:extLst>
+              <a:ext uri="{FF2B5EF4-FFF2-40B4-BE49-F238E27FC236}">
+                <a16:creationId xmlns:a16="http://schemas.microsoft.com/office/drawing/2014/main" id="{762E8DCE-9B6B-7242-B40D-C002DF5E6BAA}"/>
+              </a:ext>
+            </a:extLst>
+          </p:cNvPr>
+          <p:cNvSpPr txBox="1"/>
+          <p:nvPr/>
+        </p:nvSpPr>
+        <p:spPr>
+          <a:xfrm>
+            <a:off x="1070452" y="2947720"/>
+            <a:ext cx="1645579" cy="369332"/>
+          </a:xfrm>
+          <a:prstGeom prst="rect">
+            <a:avLst/>
+          </a:prstGeom>
+          <a:noFill/>
+          <a:ln>
+            <a:solidFill>
+              <a:srgbClr val="FF0000"/>
+            </a:solidFill>
+          </a:ln>
+        </p:spPr>
+        <p:txBody>
+          <a:bodyPr wrap="none" rtlCol="0">
+            <a:spAutoFit/>
+          </a:bodyPr>
+          <a:lstStyle/>
+          <a:p>
+            <a:r>
+              <a:rPr lang="en-US" dirty="0"/>
+              <a:t>GOLD Volatility</a:t>
+            </a:r>
+          </a:p>
+        </p:txBody>
+      </p:sp>
+      <p:sp>
+        <p:nvSpPr>
+          <p:cNvPr id="7" name="TextBox 6">
+            <a:extLst>
+              <a:ext uri="{FF2B5EF4-FFF2-40B4-BE49-F238E27FC236}">
+                <a16:creationId xmlns:a16="http://schemas.microsoft.com/office/drawing/2014/main" id="{6BA2E551-8784-5D48-8CA0-6800F5D43AE8}"/>
+              </a:ext>
+            </a:extLst>
+          </p:cNvPr>
+          <p:cNvSpPr txBox="1"/>
+          <p:nvPr/>
+        </p:nvSpPr>
+        <p:spPr>
+          <a:xfrm>
+            <a:off x="4845554" y="2947720"/>
+            <a:ext cx="1345368" cy="369332"/>
+          </a:xfrm>
+          <a:prstGeom prst="rect">
+            <a:avLst/>
+          </a:prstGeom>
+          <a:noFill/>
+          <a:ln>
+            <a:solidFill>
+              <a:srgbClr val="FF0000"/>
+            </a:solidFill>
+          </a:ln>
+        </p:spPr>
+        <p:txBody>
+          <a:bodyPr wrap="none" rtlCol="0">
+            <a:spAutoFit/>
+          </a:bodyPr>
+          <a:lstStyle/>
+          <a:p>
+            <a:r>
+              <a:rPr lang="en-US" dirty="0"/>
+              <a:t>TLT Volatility</a:t>
+            </a:r>
+          </a:p>
+        </p:txBody>
+      </p:sp>
+      <p:sp>
+        <p:nvSpPr>
+          <p:cNvPr id="9" name="TextBox 8">
+            <a:extLst>
+              <a:ext uri="{FF2B5EF4-FFF2-40B4-BE49-F238E27FC236}">
+                <a16:creationId xmlns:a16="http://schemas.microsoft.com/office/drawing/2014/main" id="{A2265E11-847A-6A45-81C3-DF9435A9021D}"/>
+              </a:ext>
+            </a:extLst>
+          </p:cNvPr>
+          <p:cNvSpPr txBox="1"/>
+          <p:nvPr/>
+        </p:nvSpPr>
+        <p:spPr>
+          <a:xfrm>
+            <a:off x="8466361" y="2877272"/>
+            <a:ext cx="2185791" cy="369332"/>
+          </a:xfrm>
+          <a:prstGeom prst="rect">
+            <a:avLst/>
+          </a:prstGeom>
+          <a:noFill/>
+          <a:ln>
+            <a:solidFill>
+              <a:srgbClr val="FF0000"/>
+            </a:solidFill>
+          </a:ln>
+        </p:spPr>
+        <p:txBody>
+          <a:bodyPr wrap="none" rtlCol="0">
+            <a:spAutoFit/>
+          </a:bodyPr>
+          <a:lstStyle/>
+          <a:p>
+            <a:r>
+              <a:rPr lang="en-US" dirty="0"/>
+              <a:t>SPY/Sectors Volatility</a:t>
+            </a:r>
+          </a:p>
+        </p:txBody>
+      </p:sp>
       <p:pic>
         <p:nvPicPr>
-          <p:cNvPr id="3" name="Picture 2">
+          <p:cNvPr id="4" name="Picture 3">
             <a:extLst>
               <a:ext uri="{FF2B5EF4-FFF2-40B4-BE49-F238E27FC236}">
-                <a16:creationId xmlns:a16="http://schemas.microsoft.com/office/drawing/2014/main" id="{3EB06352-49B7-8047-8345-F482D3894BE0}"/>
+                <a16:creationId xmlns:a16="http://schemas.microsoft.com/office/drawing/2014/main" id="{2F18F3AE-4FC6-D548-BAE0-DB2F1325B134}"/>
               </a:ext>
             </a:extLst>
           </p:cNvPr>
@@ -7572,8 +7900,8 @@
         </p:blipFill>
         <p:spPr>
           <a:xfrm>
-            <a:off x="921340" y="3317052"/>
-            <a:ext cx="1943802" cy="2392372"/>
+            <a:off x="222405" y="3317052"/>
+            <a:ext cx="3343494" cy="2441722"/>
           </a:xfrm>
           <a:prstGeom prst="rect">
             <a:avLst/>
@@ -7585,52 +7913,12 @@
           </a:ln>
         </p:spPr>
       </p:pic>
-      <p:sp>
-        <p:nvSpPr>
-          <p:cNvPr id="6" name="TextBox 5">
+      <p:pic>
+        <p:nvPicPr>
+          <p:cNvPr id="5" name="Picture 4">
             <a:extLst>
               <a:ext uri="{FF2B5EF4-FFF2-40B4-BE49-F238E27FC236}">
-                <a16:creationId xmlns:a16="http://schemas.microsoft.com/office/drawing/2014/main" id="{762E8DCE-9B6B-7242-B40D-C002DF5E6BAA}"/>
-              </a:ext>
-            </a:extLst>
-          </p:cNvPr>
-          <p:cNvSpPr txBox="1"/>
-          <p:nvPr/>
-        </p:nvSpPr>
-        <p:spPr>
-          <a:xfrm>
-            <a:off x="1070452" y="2947720"/>
-            <a:ext cx="1645579" cy="369332"/>
-          </a:xfrm>
-          <a:prstGeom prst="rect">
-            <a:avLst/>
-          </a:prstGeom>
-          <a:noFill/>
-          <a:ln>
-            <a:solidFill>
-              <a:srgbClr val="FF0000"/>
-            </a:solidFill>
-          </a:ln>
-        </p:spPr>
-        <p:txBody>
-          <a:bodyPr wrap="none" rtlCol="0">
-            <a:spAutoFit/>
-          </a:bodyPr>
-          <a:lstStyle/>
-          <a:p>
-            <a:r>
-              <a:rPr lang="en-US" dirty="0"/>
-              <a:t>GOLD Volatility</a:t>
-            </a:r>
-          </a:p>
-        </p:txBody>
-      </p:sp>
-      <p:pic>
-        <p:nvPicPr>
-          <p:cNvPr id="10" name="Picture 9">
-            <a:extLst>
-              <a:ext uri="{FF2B5EF4-FFF2-40B4-BE49-F238E27FC236}">
-                <a16:creationId xmlns:a16="http://schemas.microsoft.com/office/drawing/2014/main" id="{817E5D6C-A3C3-3240-A0B4-E7E67077CCD1}"/>
+                <a16:creationId xmlns:a16="http://schemas.microsoft.com/office/drawing/2014/main" id="{7E9E8A1B-E0A2-1B4D-A346-8DCDD4EB18AC}"/>
               </a:ext>
             </a:extLst>
           </p:cNvPr>
@@ -7647,8 +7935,8 @@
         </p:blipFill>
         <p:spPr>
           <a:xfrm>
-            <a:off x="3027149" y="3119285"/>
-            <a:ext cx="2112519" cy="2600023"/>
+            <a:off x="3846491" y="3317052"/>
+            <a:ext cx="3343494" cy="2441722"/>
           </a:xfrm>
           <a:prstGeom prst="rect">
             <a:avLst/>
@@ -7660,52 +7948,12 @@
           </a:ln>
         </p:spPr>
       </p:pic>
-      <p:sp>
-        <p:nvSpPr>
-          <p:cNvPr id="7" name="TextBox 6">
+      <p:pic>
+        <p:nvPicPr>
+          <p:cNvPr id="8" name="Picture 7">
             <a:extLst>
               <a:ext uri="{FF2B5EF4-FFF2-40B4-BE49-F238E27FC236}">
-                <a16:creationId xmlns:a16="http://schemas.microsoft.com/office/drawing/2014/main" id="{6BA2E551-8784-5D48-8CA0-6800F5D43AE8}"/>
-              </a:ext>
-            </a:extLst>
-          </p:cNvPr>
-          <p:cNvSpPr txBox="1"/>
-          <p:nvPr/>
-        </p:nvSpPr>
-        <p:spPr>
-          <a:xfrm>
-            <a:off x="3406979" y="2749953"/>
-            <a:ext cx="1345368" cy="369332"/>
-          </a:xfrm>
-          <a:prstGeom prst="rect">
-            <a:avLst/>
-          </a:prstGeom>
-          <a:noFill/>
-          <a:ln>
-            <a:solidFill>
-              <a:srgbClr val="FF0000"/>
-            </a:solidFill>
-          </a:ln>
-        </p:spPr>
-        <p:txBody>
-          <a:bodyPr wrap="none" rtlCol="0">
-            <a:spAutoFit/>
-          </a:bodyPr>
-          <a:lstStyle/>
-          <a:p>
-            <a:r>
-              <a:rPr lang="en-US" dirty="0"/>
-              <a:t>TLT Volatility</a:t>
-            </a:r>
-          </a:p>
-        </p:txBody>
-      </p:sp>
-      <p:pic>
-        <p:nvPicPr>
-          <p:cNvPr id="11" name="Picture 10">
-            <a:extLst>
-              <a:ext uri="{FF2B5EF4-FFF2-40B4-BE49-F238E27FC236}">
-                <a16:creationId xmlns:a16="http://schemas.microsoft.com/office/drawing/2014/main" id="{3561C86E-3959-6143-96F7-0F97A49AE6D1}"/>
+                <a16:creationId xmlns:a16="http://schemas.microsoft.com/office/drawing/2014/main" id="{66063ADD-20FC-6549-959C-9140104A1AAC}"/>
               </a:ext>
             </a:extLst>
           </p:cNvPr>
@@ -7722,8 +7970,8 @@
         </p:blipFill>
         <p:spPr>
           <a:xfrm>
-            <a:off x="5481823" y="3246604"/>
-            <a:ext cx="6501160" cy="2434568"/>
+            <a:off x="7503844" y="3246604"/>
+            <a:ext cx="4110823" cy="2512170"/>
           </a:xfrm>
           <a:prstGeom prst="rect">
             <a:avLst/>
@@ -7737,10 +7985,424 @@
       </p:pic>
       <p:sp>
         <p:nvSpPr>
-          <p:cNvPr id="9" name="TextBox 8">
+          <p:cNvPr id="12" name="Striped Right Arrow 11">
             <a:extLst>
               <a:ext uri="{FF2B5EF4-FFF2-40B4-BE49-F238E27FC236}">
-                <a16:creationId xmlns:a16="http://schemas.microsoft.com/office/drawing/2014/main" id="{A2265E11-847A-6A45-81C3-DF9435A9021D}"/>
+                <a16:creationId xmlns:a16="http://schemas.microsoft.com/office/drawing/2014/main" id="{70494ABA-CC4A-234C-B882-0C290D78FB64}"/>
+              </a:ext>
+            </a:extLst>
+          </p:cNvPr>
+          <p:cNvSpPr/>
+          <p:nvPr/>
+        </p:nvSpPr>
+        <p:spPr>
+          <a:xfrm rot="16200000">
+            <a:off x="3074185" y="5909552"/>
+            <a:ext cx="466927" cy="165370"/>
+          </a:xfrm>
+          <a:prstGeom prst="stripedRightArrow">
+            <a:avLst/>
+          </a:prstGeom>
+        </p:spPr>
+        <p:style>
+          <a:lnRef idx="2">
+            <a:schemeClr val="accent1">
+              <a:shade val="50000"/>
+            </a:schemeClr>
+          </a:lnRef>
+          <a:fillRef idx="1">
+            <a:schemeClr val="accent1"/>
+          </a:fillRef>
+          <a:effectRef idx="0">
+            <a:schemeClr val="accent1"/>
+          </a:effectRef>
+          <a:fontRef idx="minor">
+            <a:schemeClr val="lt1"/>
+          </a:fontRef>
+        </p:style>
+        <p:txBody>
+          <a:bodyPr rtlCol="0" anchor="ctr"/>
+          <a:lstStyle/>
+          <a:p>
+            <a:pPr algn="ctr"/>
+            <a:endParaRPr lang="en-US"/>
+          </a:p>
+        </p:txBody>
+      </p:sp>
+      <p:sp>
+        <p:nvSpPr>
+          <p:cNvPr id="13" name="Striped Right Arrow 12">
+            <a:extLst>
+              <a:ext uri="{FF2B5EF4-FFF2-40B4-BE49-F238E27FC236}">
+                <a16:creationId xmlns:a16="http://schemas.microsoft.com/office/drawing/2014/main" id="{5A6DDA39-0271-4840-B511-ABD53A37D89D}"/>
+              </a:ext>
+            </a:extLst>
+          </p:cNvPr>
+          <p:cNvSpPr/>
+          <p:nvPr/>
+        </p:nvSpPr>
+        <p:spPr>
+          <a:xfrm rot="16200000">
+            <a:off x="2615454" y="5909553"/>
+            <a:ext cx="466927" cy="165370"/>
+          </a:xfrm>
+          <a:prstGeom prst="stripedRightArrow">
+            <a:avLst/>
+          </a:prstGeom>
+        </p:spPr>
+        <p:style>
+          <a:lnRef idx="2">
+            <a:schemeClr val="accent1">
+              <a:shade val="50000"/>
+            </a:schemeClr>
+          </a:lnRef>
+          <a:fillRef idx="1">
+            <a:schemeClr val="accent1"/>
+          </a:fillRef>
+          <a:effectRef idx="0">
+            <a:schemeClr val="accent1"/>
+          </a:effectRef>
+          <a:fontRef idx="minor">
+            <a:schemeClr val="lt1"/>
+          </a:fontRef>
+        </p:style>
+        <p:txBody>
+          <a:bodyPr rtlCol="0" anchor="ctr"/>
+          <a:lstStyle/>
+          <a:p>
+            <a:pPr algn="ctr"/>
+            <a:endParaRPr lang="en-US"/>
+          </a:p>
+        </p:txBody>
+      </p:sp>
+      <p:sp>
+        <p:nvSpPr>
+          <p:cNvPr id="14" name="Striped Right Arrow 13">
+            <a:extLst>
+              <a:ext uri="{FF2B5EF4-FFF2-40B4-BE49-F238E27FC236}">
+                <a16:creationId xmlns:a16="http://schemas.microsoft.com/office/drawing/2014/main" id="{8D5DFECA-7083-594F-9ED6-15E33D111F5B}"/>
+              </a:ext>
+            </a:extLst>
+          </p:cNvPr>
+          <p:cNvSpPr/>
+          <p:nvPr/>
+        </p:nvSpPr>
+        <p:spPr>
+          <a:xfrm rot="16200000">
+            <a:off x="2273944" y="5909552"/>
+            <a:ext cx="466927" cy="165370"/>
+          </a:xfrm>
+          <a:prstGeom prst="stripedRightArrow">
+            <a:avLst/>
+          </a:prstGeom>
+        </p:spPr>
+        <p:style>
+          <a:lnRef idx="2">
+            <a:schemeClr val="accent1">
+              <a:shade val="50000"/>
+            </a:schemeClr>
+          </a:lnRef>
+          <a:fillRef idx="1">
+            <a:schemeClr val="accent1"/>
+          </a:fillRef>
+          <a:effectRef idx="0">
+            <a:schemeClr val="accent1"/>
+          </a:effectRef>
+          <a:fontRef idx="minor">
+            <a:schemeClr val="lt1"/>
+          </a:fontRef>
+        </p:style>
+        <p:txBody>
+          <a:bodyPr rtlCol="0" anchor="ctr"/>
+          <a:lstStyle/>
+          <a:p>
+            <a:pPr algn="ctr"/>
+            <a:endParaRPr lang="en-US"/>
+          </a:p>
+        </p:txBody>
+      </p:sp>
+      <p:sp>
+        <p:nvSpPr>
+          <p:cNvPr id="15" name="Striped Right Arrow 14">
+            <a:extLst>
+              <a:ext uri="{FF2B5EF4-FFF2-40B4-BE49-F238E27FC236}">
+                <a16:creationId xmlns:a16="http://schemas.microsoft.com/office/drawing/2014/main" id="{CC692F90-A551-974A-9CB5-B4783CFEACB9}"/>
+              </a:ext>
+            </a:extLst>
+          </p:cNvPr>
+          <p:cNvSpPr/>
+          <p:nvPr/>
+        </p:nvSpPr>
+        <p:spPr>
+          <a:xfrm rot="16200000">
+            <a:off x="6713331" y="5909552"/>
+            <a:ext cx="466927" cy="165370"/>
+          </a:xfrm>
+          <a:prstGeom prst="stripedRightArrow">
+            <a:avLst/>
+          </a:prstGeom>
+        </p:spPr>
+        <p:style>
+          <a:lnRef idx="2">
+            <a:schemeClr val="accent1">
+              <a:shade val="50000"/>
+            </a:schemeClr>
+          </a:lnRef>
+          <a:fillRef idx="1">
+            <a:schemeClr val="accent1"/>
+          </a:fillRef>
+          <a:effectRef idx="0">
+            <a:schemeClr val="accent1"/>
+          </a:effectRef>
+          <a:fontRef idx="minor">
+            <a:schemeClr val="lt1"/>
+          </a:fontRef>
+        </p:style>
+        <p:txBody>
+          <a:bodyPr rtlCol="0" anchor="ctr"/>
+          <a:lstStyle/>
+          <a:p>
+            <a:pPr algn="ctr"/>
+            <a:endParaRPr lang="en-US"/>
+          </a:p>
+        </p:txBody>
+      </p:sp>
+      <p:sp>
+        <p:nvSpPr>
+          <p:cNvPr id="16" name="Striped Right Arrow 15">
+            <a:extLst>
+              <a:ext uri="{FF2B5EF4-FFF2-40B4-BE49-F238E27FC236}">
+                <a16:creationId xmlns:a16="http://schemas.microsoft.com/office/drawing/2014/main" id="{C3AF5E52-B1B1-4544-BDEC-7B86EBF2C0B1}"/>
+              </a:ext>
+            </a:extLst>
+          </p:cNvPr>
+          <p:cNvSpPr/>
+          <p:nvPr/>
+        </p:nvSpPr>
+        <p:spPr>
+          <a:xfrm rot="16200000">
+            <a:off x="6254600" y="5909553"/>
+            <a:ext cx="466927" cy="165370"/>
+          </a:xfrm>
+          <a:prstGeom prst="stripedRightArrow">
+            <a:avLst/>
+          </a:prstGeom>
+        </p:spPr>
+        <p:style>
+          <a:lnRef idx="2">
+            <a:schemeClr val="accent1">
+              <a:shade val="50000"/>
+            </a:schemeClr>
+          </a:lnRef>
+          <a:fillRef idx="1">
+            <a:schemeClr val="accent1"/>
+          </a:fillRef>
+          <a:effectRef idx="0">
+            <a:schemeClr val="accent1"/>
+          </a:effectRef>
+          <a:fontRef idx="minor">
+            <a:schemeClr val="lt1"/>
+          </a:fontRef>
+        </p:style>
+        <p:txBody>
+          <a:bodyPr rtlCol="0" anchor="ctr"/>
+          <a:lstStyle/>
+          <a:p>
+            <a:pPr algn="ctr"/>
+            <a:endParaRPr lang="en-US"/>
+          </a:p>
+        </p:txBody>
+      </p:sp>
+      <p:sp>
+        <p:nvSpPr>
+          <p:cNvPr id="17" name="Striped Right Arrow 16">
+            <a:extLst>
+              <a:ext uri="{FF2B5EF4-FFF2-40B4-BE49-F238E27FC236}">
+                <a16:creationId xmlns:a16="http://schemas.microsoft.com/office/drawing/2014/main" id="{0B77D941-C081-6044-8F67-2EA66CE0F6C7}"/>
+              </a:ext>
+            </a:extLst>
+          </p:cNvPr>
+          <p:cNvSpPr/>
+          <p:nvPr/>
+        </p:nvSpPr>
+        <p:spPr>
+          <a:xfrm rot="16200000">
+            <a:off x="5913090" y="5909552"/>
+            <a:ext cx="466927" cy="165370"/>
+          </a:xfrm>
+          <a:prstGeom prst="stripedRightArrow">
+            <a:avLst/>
+          </a:prstGeom>
+        </p:spPr>
+        <p:style>
+          <a:lnRef idx="2">
+            <a:schemeClr val="accent1">
+              <a:shade val="50000"/>
+            </a:schemeClr>
+          </a:lnRef>
+          <a:fillRef idx="1">
+            <a:schemeClr val="accent1"/>
+          </a:fillRef>
+          <a:effectRef idx="0">
+            <a:schemeClr val="accent1"/>
+          </a:effectRef>
+          <a:fontRef idx="minor">
+            <a:schemeClr val="lt1"/>
+          </a:fontRef>
+        </p:style>
+        <p:txBody>
+          <a:bodyPr rtlCol="0" anchor="ctr"/>
+          <a:lstStyle/>
+          <a:p>
+            <a:pPr algn="ctr"/>
+            <a:endParaRPr lang="en-US"/>
+          </a:p>
+        </p:txBody>
+      </p:sp>
+      <p:sp>
+        <p:nvSpPr>
+          <p:cNvPr id="18" name="Striped Right Arrow 17">
+            <a:extLst>
+              <a:ext uri="{FF2B5EF4-FFF2-40B4-BE49-F238E27FC236}">
+                <a16:creationId xmlns:a16="http://schemas.microsoft.com/office/drawing/2014/main" id="{BEFE0A7E-13EA-7743-8130-6B8CCDFA2AFF}"/>
+              </a:ext>
+            </a:extLst>
+          </p:cNvPr>
+          <p:cNvSpPr/>
+          <p:nvPr/>
+        </p:nvSpPr>
+        <p:spPr>
+          <a:xfrm rot="16200000">
+            <a:off x="11127448" y="5909552"/>
+            <a:ext cx="466927" cy="165370"/>
+          </a:xfrm>
+          <a:prstGeom prst="stripedRightArrow">
+            <a:avLst/>
+          </a:prstGeom>
+        </p:spPr>
+        <p:style>
+          <a:lnRef idx="2">
+            <a:schemeClr val="accent1">
+              <a:shade val="50000"/>
+            </a:schemeClr>
+          </a:lnRef>
+          <a:fillRef idx="1">
+            <a:schemeClr val="accent1"/>
+          </a:fillRef>
+          <a:effectRef idx="0">
+            <a:schemeClr val="accent1"/>
+          </a:effectRef>
+          <a:fontRef idx="minor">
+            <a:schemeClr val="lt1"/>
+          </a:fontRef>
+        </p:style>
+        <p:txBody>
+          <a:bodyPr rtlCol="0" anchor="ctr"/>
+          <a:lstStyle/>
+          <a:p>
+            <a:pPr algn="ctr"/>
+            <a:endParaRPr lang="en-US"/>
+          </a:p>
+        </p:txBody>
+      </p:sp>
+      <p:sp>
+        <p:nvSpPr>
+          <p:cNvPr id="19" name="Striped Right Arrow 18">
+            <a:extLst>
+              <a:ext uri="{FF2B5EF4-FFF2-40B4-BE49-F238E27FC236}">
+                <a16:creationId xmlns:a16="http://schemas.microsoft.com/office/drawing/2014/main" id="{C598FD2A-7668-A14D-83C9-221AA65698D0}"/>
+              </a:ext>
+            </a:extLst>
+          </p:cNvPr>
+          <p:cNvSpPr/>
+          <p:nvPr/>
+        </p:nvSpPr>
+        <p:spPr>
+          <a:xfrm rot="16200000">
+            <a:off x="10487714" y="5909551"/>
+            <a:ext cx="466927" cy="165370"/>
+          </a:xfrm>
+          <a:prstGeom prst="stripedRightArrow">
+            <a:avLst/>
+          </a:prstGeom>
+        </p:spPr>
+        <p:style>
+          <a:lnRef idx="2">
+            <a:schemeClr val="accent1">
+              <a:shade val="50000"/>
+            </a:schemeClr>
+          </a:lnRef>
+          <a:fillRef idx="1">
+            <a:schemeClr val="accent1"/>
+          </a:fillRef>
+          <a:effectRef idx="0">
+            <a:schemeClr val="accent1"/>
+          </a:effectRef>
+          <a:fontRef idx="minor">
+            <a:schemeClr val="lt1"/>
+          </a:fontRef>
+        </p:style>
+        <p:txBody>
+          <a:bodyPr rtlCol="0" anchor="ctr"/>
+          <a:lstStyle/>
+          <a:p>
+            <a:pPr algn="ctr"/>
+            <a:endParaRPr lang="en-US"/>
+          </a:p>
+        </p:txBody>
+      </p:sp>
+      <p:sp>
+        <p:nvSpPr>
+          <p:cNvPr id="20" name="Striped Right Arrow 19">
+            <a:extLst>
+              <a:ext uri="{FF2B5EF4-FFF2-40B4-BE49-F238E27FC236}">
+                <a16:creationId xmlns:a16="http://schemas.microsoft.com/office/drawing/2014/main" id="{0237771D-12D3-A947-BC6B-3EA68AD961BB}"/>
+              </a:ext>
+            </a:extLst>
+          </p:cNvPr>
+          <p:cNvSpPr/>
+          <p:nvPr/>
+        </p:nvSpPr>
+        <p:spPr>
+          <a:xfrm rot="16200000">
+            <a:off x="10146204" y="5909550"/>
+            <a:ext cx="466927" cy="165370"/>
+          </a:xfrm>
+          <a:prstGeom prst="stripedRightArrow">
+            <a:avLst/>
+          </a:prstGeom>
+        </p:spPr>
+        <p:style>
+          <a:lnRef idx="2">
+            <a:schemeClr val="accent1">
+              <a:shade val="50000"/>
+            </a:schemeClr>
+          </a:lnRef>
+          <a:fillRef idx="1">
+            <a:schemeClr val="accent1"/>
+          </a:fillRef>
+          <a:effectRef idx="0">
+            <a:schemeClr val="accent1"/>
+          </a:effectRef>
+          <a:fontRef idx="minor">
+            <a:schemeClr val="lt1"/>
+          </a:fontRef>
+        </p:style>
+        <p:txBody>
+          <a:bodyPr rtlCol="0" anchor="ctr"/>
+          <a:lstStyle/>
+          <a:p>
+            <a:pPr algn="ctr"/>
+            <a:endParaRPr lang="en-US"/>
+          </a:p>
+        </p:txBody>
+      </p:sp>
+      <p:sp>
+        <p:nvSpPr>
+          <p:cNvPr id="21" name="TextBox 20">
+            <a:extLst>
+              <a:ext uri="{FF2B5EF4-FFF2-40B4-BE49-F238E27FC236}">
+                <a16:creationId xmlns:a16="http://schemas.microsoft.com/office/drawing/2014/main" id="{0D8C270B-51D8-8245-A44B-19F14C8D887A}"/>
               </a:ext>
             </a:extLst>
           </p:cNvPr>
@@ -7749,36 +8411,414 @@
         </p:nvSpPr>
         <p:spPr>
           <a:xfrm>
-            <a:off x="7639508" y="2877272"/>
-            <a:ext cx="2185791" cy="369332"/>
+            <a:off x="2305455" y="6225699"/>
+            <a:ext cx="9309211" cy="369332"/>
           </a:xfrm>
           <a:prstGeom prst="rect">
             <a:avLst/>
           </a:prstGeom>
-          <a:noFill/>
+          <a:solidFill>
+            <a:srgbClr val="FFC000"/>
+          </a:solidFill>
+          <a:ln>
+            <a:solidFill>
+              <a:schemeClr val="tx1"/>
+            </a:solidFill>
+          </a:ln>
+        </p:spPr>
+        <p:txBody>
+          <a:bodyPr wrap="square" rtlCol="0">
+            <a:spAutoFit/>
+          </a:bodyPr>
+          <a:lstStyle/>
+          <a:p>
+            <a:pPr algn="ctr"/>
+            <a:r>
+              <a:rPr lang="en-US" dirty="0"/>
+              <a:t>Indexes to identify Bu/Be Trends, based on %Change, Close Prices &amp; Volumes</a:t>
+            </a:r>
+          </a:p>
+        </p:txBody>
+      </p:sp>
+    </p:spTree>
+    <p:extLst>
+      <p:ext uri="{BB962C8B-B14F-4D97-AF65-F5344CB8AC3E}">
+        <p14:creationId xmlns:p14="http://schemas.microsoft.com/office/powerpoint/2010/main" val="794411141"/>
+      </p:ext>
+    </p:extLst>
+  </p:cSld>
+  <p:clrMapOvr>
+    <a:masterClrMapping/>
+  </p:clrMapOvr>
+</p:sld>
+</file>
+
+<file path=ppt/slides/slide8.xml><?xml version="1.0" encoding="utf-8"?>
+<p:sld xmlns:a="http://schemas.openxmlformats.org/drawingml/2006/main" xmlns:r="http://schemas.openxmlformats.org/officeDocument/2006/relationships" xmlns:p="http://schemas.openxmlformats.org/presentationml/2006/main">
+  <p:cSld>
+    <p:spTree>
+      <p:nvGrpSpPr>
+        <p:cNvPr id="1" name=""/>
+        <p:cNvGrpSpPr/>
+        <p:nvPr/>
+      </p:nvGrpSpPr>
+      <p:grpSpPr>
+        <a:xfrm>
+          <a:off x="0" y="0"/>
+          <a:ext cx="0" cy="0"/>
+          <a:chOff x="0" y="0"/>
+          <a:chExt cx="0" cy="0"/>
+        </a:xfrm>
+      </p:grpSpPr>
+      <p:sp>
+        <p:nvSpPr>
+          <p:cNvPr id="2" name="Title 1">
+            <a:extLst>
+              <a:ext uri="{FF2B5EF4-FFF2-40B4-BE49-F238E27FC236}">
+                <a16:creationId xmlns:a16="http://schemas.microsoft.com/office/drawing/2014/main" id="{CB42E2D6-819E-C24C-B2F2-A46C55ACF6E4}"/>
+              </a:ext>
+            </a:extLst>
+          </p:cNvPr>
+          <p:cNvSpPr>
+            <a:spLocks noGrp="1"/>
+          </p:cNvSpPr>
+          <p:nvPr>
+            <p:ph type="title"/>
+          </p:nvPr>
+        </p:nvSpPr>
+        <p:spPr/>
+        <p:txBody>
+          <a:bodyPr/>
+          <a:lstStyle/>
+          <a:p>
+            <a:r>
+              <a:rPr lang="en-US" dirty="0"/>
+              <a:t>Volatility Index</a:t>
+            </a:r>
+            <a:br>
+              <a:rPr lang="en-US" dirty="0"/>
+            </a:br>
+            <a:r>
+              <a:rPr lang="en-US" dirty="0"/>
+              <a:t>(Tailor Made – GOLD Visualization)</a:t>
+            </a:r>
+          </a:p>
+        </p:txBody>
+      </p:sp>
+      <p:pic>
+        <p:nvPicPr>
+          <p:cNvPr id="10" name="Picture 9">
+            <a:extLst>
+              <a:ext uri="{FF2B5EF4-FFF2-40B4-BE49-F238E27FC236}">
+                <a16:creationId xmlns:a16="http://schemas.microsoft.com/office/drawing/2014/main" id="{48BF2314-B9A7-8542-8A4D-AB6FCC5B73C4}"/>
+              </a:ext>
+            </a:extLst>
+          </p:cNvPr>
+          <p:cNvPicPr>
+            <a:picLocks noChangeAspect="1"/>
+          </p:cNvPicPr>
+          <p:nvPr/>
+        </p:nvPicPr>
+        <p:blipFill>
+          <a:blip r:embed="rId2"/>
+          <a:stretch>
+            <a:fillRect/>
+          </a:stretch>
+        </p:blipFill>
+        <p:spPr>
+          <a:xfrm>
+            <a:off x="913775" y="1917454"/>
+            <a:ext cx="4687338" cy="2077107"/>
+          </a:xfrm>
+          <a:prstGeom prst="rect">
+            <a:avLst/>
+          </a:prstGeom>
           <a:ln>
             <a:solidFill>
               <a:srgbClr val="FF0000"/>
             </a:solidFill>
           </a:ln>
         </p:spPr>
-        <p:txBody>
-          <a:bodyPr wrap="none" rtlCol="0">
-            <a:spAutoFit/>
-          </a:bodyPr>
-          <a:lstStyle/>
-          <a:p>
-            <a:r>
-              <a:rPr lang="en-US" dirty="0"/>
-              <a:t>SPY/Sectors Volatility</a:t>
-            </a:r>
-          </a:p>
-        </p:txBody>
-      </p:sp>
+      </p:pic>
+      <p:pic>
+        <p:nvPicPr>
+          <p:cNvPr id="11" name="Picture 10">
+            <a:extLst>
+              <a:ext uri="{FF2B5EF4-FFF2-40B4-BE49-F238E27FC236}">
+                <a16:creationId xmlns:a16="http://schemas.microsoft.com/office/drawing/2014/main" id="{E2567EB0-6B5D-2D41-A165-D38A699FD3DE}"/>
+              </a:ext>
+            </a:extLst>
+          </p:cNvPr>
+          <p:cNvPicPr>
+            <a:picLocks noChangeAspect="1"/>
+          </p:cNvPicPr>
+          <p:nvPr/>
+        </p:nvPicPr>
+        <p:blipFill>
+          <a:blip r:embed="rId3"/>
+          <a:stretch>
+            <a:fillRect/>
+          </a:stretch>
+        </p:blipFill>
+        <p:spPr>
+          <a:xfrm>
+            <a:off x="6585368" y="1917454"/>
+            <a:ext cx="4692858" cy="2079553"/>
+          </a:xfrm>
+          <a:prstGeom prst="rect">
+            <a:avLst/>
+          </a:prstGeom>
+          <a:ln>
+            <a:solidFill>
+              <a:srgbClr val="FF0000"/>
+            </a:solidFill>
+          </a:ln>
+        </p:spPr>
+      </p:pic>
+      <p:pic>
+        <p:nvPicPr>
+          <p:cNvPr id="26" name="Picture 25">
+            <a:extLst>
+              <a:ext uri="{FF2B5EF4-FFF2-40B4-BE49-F238E27FC236}">
+                <a16:creationId xmlns:a16="http://schemas.microsoft.com/office/drawing/2014/main" id="{68A1DA4B-8C69-B645-84FD-DAF0F7AACB31}"/>
+              </a:ext>
+            </a:extLst>
+          </p:cNvPr>
+          <p:cNvPicPr>
+            <a:picLocks noChangeAspect="1"/>
+          </p:cNvPicPr>
+          <p:nvPr/>
+        </p:nvPicPr>
+        <p:blipFill>
+          <a:blip r:embed="rId2"/>
+          <a:stretch>
+            <a:fillRect/>
+          </a:stretch>
+        </p:blipFill>
+        <p:spPr>
+          <a:xfrm>
+            <a:off x="3760078" y="4258377"/>
+            <a:ext cx="4671844" cy="2070241"/>
+          </a:xfrm>
+          <a:prstGeom prst="rect">
+            <a:avLst/>
+          </a:prstGeom>
+          <a:ln>
+            <a:solidFill>
+              <a:srgbClr val="FF0000"/>
+            </a:solidFill>
+          </a:ln>
+        </p:spPr>
+      </p:pic>
     </p:spTree>
     <p:extLst>
       <p:ext uri="{BB962C8B-B14F-4D97-AF65-F5344CB8AC3E}">
-        <p14:creationId xmlns:p14="http://schemas.microsoft.com/office/powerpoint/2010/main" val="794411141"/>
+        <p14:creationId xmlns:p14="http://schemas.microsoft.com/office/powerpoint/2010/main" val="4181571373"/>
+      </p:ext>
+    </p:extLst>
+  </p:cSld>
+  <p:clrMapOvr>
+    <a:masterClrMapping/>
+  </p:clrMapOvr>
+</p:sld>
+</file>
+
+<file path=ppt/slides/slide9.xml><?xml version="1.0" encoding="utf-8"?>
+<p:sld xmlns:a="http://schemas.openxmlformats.org/drawingml/2006/main" xmlns:r="http://schemas.openxmlformats.org/officeDocument/2006/relationships" xmlns:p="http://schemas.openxmlformats.org/presentationml/2006/main">
+  <p:cSld>
+    <p:spTree>
+      <p:nvGrpSpPr>
+        <p:cNvPr id="1" name=""/>
+        <p:cNvGrpSpPr/>
+        <p:nvPr/>
+      </p:nvGrpSpPr>
+      <p:grpSpPr>
+        <a:xfrm>
+          <a:off x="0" y="0"/>
+          <a:ext cx="0" cy="0"/>
+          <a:chOff x="0" y="0"/>
+          <a:chExt cx="0" cy="0"/>
+        </a:xfrm>
+      </p:grpSpPr>
+      <p:sp>
+        <p:nvSpPr>
+          <p:cNvPr id="2" name="Title 1">
+            <a:extLst>
+              <a:ext uri="{FF2B5EF4-FFF2-40B4-BE49-F238E27FC236}">
+                <a16:creationId xmlns:a16="http://schemas.microsoft.com/office/drawing/2014/main" id="{CB42E2D6-819E-C24C-B2F2-A46C55ACF6E4}"/>
+              </a:ext>
+            </a:extLst>
+          </p:cNvPr>
+          <p:cNvSpPr>
+            <a:spLocks noGrp="1"/>
+          </p:cNvSpPr>
+          <p:nvPr>
+            <p:ph type="title"/>
+          </p:nvPr>
+        </p:nvSpPr>
+        <p:spPr/>
+        <p:txBody>
+          <a:bodyPr/>
+          <a:lstStyle/>
+          <a:p>
+            <a:r>
+              <a:rPr lang="en-US" dirty="0"/>
+              <a:t>Volatility Index</a:t>
+            </a:r>
+            <a:br>
+              <a:rPr lang="en-US" dirty="0"/>
+            </a:br>
+            <a:r>
+              <a:rPr lang="en-US" dirty="0"/>
+              <a:t>(Tailor Made – TLT Visualization)</a:t>
+            </a:r>
+          </a:p>
+        </p:txBody>
+      </p:sp>
+      <p:pic>
+        <p:nvPicPr>
+          <p:cNvPr id="3" name="Picture 2">
+            <a:extLst>
+              <a:ext uri="{FF2B5EF4-FFF2-40B4-BE49-F238E27FC236}">
+                <a16:creationId xmlns:a16="http://schemas.microsoft.com/office/drawing/2014/main" id="{1D00C499-C746-8C4F-99C1-2A66903AB05A}"/>
+              </a:ext>
+            </a:extLst>
+          </p:cNvPr>
+          <p:cNvPicPr>
+            <a:picLocks noChangeAspect="1"/>
+          </p:cNvPicPr>
+          <p:nvPr/>
+        </p:nvPicPr>
+        <p:blipFill>
+          <a:blip r:embed="rId2"/>
+          <a:stretch>
+            <a:fillRect/>
+          </a:stretch>
+        </p:blipFill>
+        <p:spPr>
+          <a:xfrm>
+            <a:off x="913775" y="1919900"/>
+            <a:ext cx="4687338" cy="2077107"/>
+          </a:xfrm>
+          <a:prstGeom prst="rect">
+            <a:avLst/>
+          </a:prstGeom>
+          <a:ln>
+            <a:solidFill>
+              <a:srgbClr val="FF0000"/>
+            </a:solidFill>
+          </a:ln>
+        </p:spPr>
+      </p:pic>
+      <p:pic>
+        <p:nvPicPr>
+          <p:cNvPr id="4" name="Picture 3">
+            <a:extLst>
+              <a:ext uri="{FF2B5EF4-FFF2-40B4-BE49-F238E27FC236}">
+                <a16:creationId xmlns:a16="http://schemas.microsoft.com/office/drawing/2014/main" id="{98AA1147-8ECF-EC44-BAEA-79A8248496E8}"/>
+              </a:ext>
+            </a:extLst>
+          </p:cNvPr>
+          <p:cNvPicPr>
+            <a:picLocks noChangeAspect="1"/>
+          </p:cNvPicPr>
+          <p:nvPr/>
+        </p:nvPicPr>
+        <p:blipFill>
+          <a:blip r:embed="rId3"/>
+          <a:stretch>
+            <a:fillRect/>
+          </a:stretch>
+        </p:blipFill>
+        <p:spPr>
+          <a:xfrm>
+            <a:off x="6590888" y="1919900"/>
+            <a:ext cx="4687338" cy="2077107"/>
+          </a:xfrm>
+          <a:prstGeom prst="rect">
+            <a:avLst/>
+          </a:prstGeom>
+          <a:ln>
+            <a:solidFill>
+              <a:srgbClr val="FF0000"/>
+            </a:solidFill>
+          </a:ln>
+        </p:spPr>
+      </p:pic>
+      <p:pic>
+        <p:nvPicPr>
+          <p:cNvPr id="5" name="Picture 4">
+            <a:extLst>
+              <a:ext uri="{FF2B5EF4-FFF2-40B4-BE49-F238E27FC236}">
+                <a16:creationId xmlns:a16="http://schemas.microsoft.com/office/drawing/2014/main" id="{BF2F70C9-1364-3340-B57B-9961C190C6F1}"/>
+              </a:ext>
+            </a:extLst>
+          </p:cNvPr>
+          <p:cNvPicPr>
+            <a:picLocks noChangeAspect="1"/>
+          </p:cNvPicPr>
+          <p:nvPr/>
+        </p:nvPicPr>
+        <p:blipFill>
+          <a:blip r:embed="rId4"/>
+          <a:stretch>
+            <a:fillRect/>
+          </a:stretch>
+        </p:blipFill>
+        <p:spPr>
+          <a:xfrm>
+            <a:off x="913775" y="4333160"/>
+            <a:ext cx="4687338" cy="2077107"/>
+          </a:xfrm>
+          <a:prstGeom prst="rect">
+            <a:avLst/>
+          </a:prstGeom>
+          <a:ln>
+            <a:solidFill>
+              <a:srgbClr val="FF0000"/>
+            </a:solidFill>
+          </a:ln>
+        </p:spPr>
+      </p:pic>
+      <p:pic>
+        <p:nvPicPr>
+          <p:cNvPr id="6" name="Picture 5">
+            <a:extLst>
+              <a:ext uri="{FF2B5EF4-FFF2-40B4-BE49-F238E27FC236}">
+                <a16:creationId xmlns:a16="http://schemas.microsoft.com/office/drawing/2014/main" id="{16C5B4B4-E96F-EA48-A0E5-4ABB930E5A4C}"/>
+              </a:ext>
+            </a:extLst>
+          </p:cNvPr>
+          <p:cNvPicPr>
+            <a:picLocks noChangeAspect="1"/>
+          </p:cNvPicPr>
+          <p:nvPr/>
+        </p:nvPicPr>
+        <p:blipFill>
+          <a:blip r:embed="rId5"/>
+          <a:stretch>
+            <a:fillRect/>
+          </a:stretch>
+        </p:blipFill>
+        <p:spPr>
+          <a:xfrm>
+            <a:off x="6590888" y="4333160"/>
+            <a:ext cx="4687338" cy="2077107"/>
+          </a:xfrm>
+          <a:prstGeom prst="rect">
+            <a:avLst/>
+          </a:prstGeom>
+          <a:ln>
+            <a:solidFill>
+              <a:srgbClr val="FF0000"/>
+            </a:solidFill>
+          </a:ln>
+        </p:spPr>
+      </p:pic>
+    </p:spTree>
+    <p:extLst>
+      <p:ext uri="{BB962C8B-B14F-4D97-AF65-F5344CB8AC3E}">
+        <p14:creationId xmlns:p14="http://schemas.microsoft.com/office/powerpoint/2010/main" val="3151688011"/>
       </p:ext>
     </p:extLst>
   </p:cSld>

</xml_diff>